<commit_message>
Ajuste de codigo em movimentações de jogo e teste de sprites menores
</commit_message>
<xml_diff>
--- a/Testes de funcionalidades/Modelagem do Game.pptx
+++ b/Testes de funcionalidades/Modelagem do Game.pptx
@@ -10,6 +10,7 @@
     <p:sldId id="258" r:id="rId4"/>
     <p:sldId id="259" r:id="rId5"/>
     <p:sldId id="260" r:id="rId6"/>
+    <p:sldId id="261" r:id="rId7"/>
   </p:sldIdLst>
   <p:sldSz cx="12192000" cy="6858000"/>
   <p:notesSz cx="6858000" cy="9144000"/>
@@ -247,7 +248,7 @@
           <a:p>
             <a:fld id="{54BA3F7A-26B6-4A40-9DE1-5C2320B3D16B}" type="datetimeFigureOut">
               <a:rPr lang="pt-BR" smtClean="0"/>
-              <a:t>22/02/2019</a:t>
+              <a:t>26/02/2019</a:t>
             </a:fld>
             <a:endParaRPr lang="pt-BR"/>
           </a:p>
@@ -417,7 +418,7 @@
           <a:p>
             <a:fld id="{54BA3F7A-26B6-4A40-9DE1-5C2320B3D16B}" type="datetimeFigureOut">
               <a:rPr lang="pt-BR" smtClean="0"/>
-              <a:t>22/02/2019</a:t>
+              <a:t>26/02/2019</a:t>
             </a:fld>
             <a:endParaRPr lang="pt-BR"/>
           </a:p>
@@ -597,7 +598,7 @@
           <a:p>
             <a:fld id="{54BA3F7A-26B6-4A40-9DE1-5C2320B3D16B}" type="datetimeFigureOut">
               <a:rPr lang="pt-BR" smtClean="0"/>
-              <a:t>22/02/2019</a:t>
+              <a:t>26/02/2019</a:t>
             </a:fld>
             <a:endParaRPr lang="pt-BR"/>
           </a:p>
@@ -767,7 +768,7 @@
           <a:p>
             <a:fld id="{54BA3F7A-26B6-4A40-9DE1-5C2320B3D16B}" type="datetimeFigureOut">
               <a:rPr lang="pt-BR" smtClean="0"/>
-              <a:t>22/02/2019</a:t>
+              <a:t>26/02/2019</a:t>
             </a:fld>
             <a:endParaRPr lang="pt-BR"/>
           </a:p>
@@ -1013,7 +1014,7 @@
           <a:p>
             <a:fld id="{54BA3F7A-26B6-4A40-9DE1-5C2320B3D16B}" type="datetimeFigureOut">
               <a:rPr lang="pt-BR" smtClean="0"/>
-              <a:t>22/02/2019</a:t>
+              <a:t>26/02/2019</a:t>
             </a:fld>
             <a:endParaRPr lang="pt-BR"/>
           </a:p>
@@ -1245,7 +1246,7 @@
           <a:p>
             <a:fld id="{54BA3F7A-26B6-4A40-9DE1-5C2320B3D16B}" type="datetimeFigureOut">
               <a:rPr lang="pt-BR" smtClean="0"/>
-              <a:t>22/02/2019</a:t>
+              <a:t>26/02/2019</a:t>
             </a:fld>
             <a:endParaRPr lang="pt-BR"/>
           </a:p>
@@ -1612,7 +1613,7 @@
           <a:p>
             <a:fld id="{54BA3F7A-26B6-4A40-9DE1-5C2320B3D16B}" type="datetimeFigureOut">
               <a:rPr lang="pt-BR" smtClean="0"/>
-              <a:t>22/02/2019</a:t>
+              <a:t>26/02/2019</a:t>
             </a:fld>
             <a:endParaRPr lang="pt-BR"/>
           </a:p>
@@ -1730,7 +1731,7 @@
           <a:p>
             <a:fld id="{54BA3F7A-26B6-4A40-9DE1-5C2320B3D16B}" type="datetimeFigureOut">
               <a:rPr lang="pt-BR" smtClean="0"/>
-              <a:t>22/02/2019</a:t>
+              <a:t>26/02/2019</a:t>
             </a:fld>
             <a:endParaRPr lang="pt-BR"/>
           </a:p>
@@ -1825,7 +1826,7 @@
           <a:p>
             <a:fld id="{54BA3F7A-26B6-4A40-9DE1-5C2320B3D16B}" type="datetimeFigureOut">
               <a:rPr lang="pt-BR" smtClean="0"/>
-              <a:t>22/02/2019</a:t>
+              <a:t>26/02/2019</a:t>
             </a:fld>
             <a:endParaRPr lang="pt-BR"/>
           </a:p>
@@ -2102,7 +2103,7 @@
           <a:p>
             <a:fld id="{54BA3F7A-26B6-4A40-9DE1-5C2320B3D16B}" type="datetimeFigureOut">
               <a:rPr lang="pt-BR" smtClean="0"/>
-              <a:t>22/02/2019</a:t>
+              <a:t>26/02/2019</a:t>
             </a:fld>
             <a:endParaRPr lang="pt-BR"/>
           </a:p>
@@ -2355,7 +2356,7 @@
           <a:p>
             <a:fld id="{54BA3F7A-26B6-4A40-9DE1-5C2320B3D16B}" type="datetimeFigureOut">
               <a:rPr lang="pt-BR" smtClean="0"/>
-              <a:t>22/02/2019</a:t>
+              <a:t>26/02/2019</a:t>
             </a:fld>
             <a:endParaRPr lang="pt-BR"/>
           </a:p>
@@ -2568,7 +2569,7 @@
           <a:p>
             <a:fld id="{54BA3F7A-26B6-4A40-9DE1-5C2320B3D16B}" type="datetimeFigureOut">
               <a:rPr lang="pt-BR" smtClean="0"/>
-              <a:t>22/02/2019</a:t>
+              <a:t>26/02/2019</a:t>
             </a:fld>
             <a:endParaRPr lang="pt-BR"/>
           </a:p>
@@ -8292,10 +8293,10 @@
             </p:nvGrpSpPr>
             <p:grpSpPr>
               <a:xfrm>
-                <a:off x="0" y="10738883"/>
-                <a:ext cx="10779761" cy="10758805"/>
-                <a:chOff x="0" y="0"/>
-                <a:chExt cx="10780114" cy="10758849"/>
+                <a:off x="0" y="10738882"/>
+                <a:ext cx="10779761" cy="10758806"/>
+                <a:chOff x="0" y="-1"/>
+                <a:chExt cx="10780114" cy="10758850"/>
               </a:xfrm>
             </p:grpSpPr>
             <p:pic>
@@ -8380,7 +8381,7 @@
               </p:blipFill>
               <p:spPr>
                 <a:xfrm>
-                  <a:off x="5380074" y="0"/>
+                  <a:off x="5380074" y="-1"/>
                   <a:ext cx="5400040" cy="5400040"/>
                 </a:xfrm>
                 <a:prstGeom prst="rect">
@@ -8425,6 +8426,396 @@
     <p:extLst>
       <p:ext uri="{BB962C8B-B14F-4D97-AF65-F5344CB8AC3E}">
         <p14:creationId xmlns:p14="http://schemas.microsoft.com/office/powerpoint/2010/main" val="525463952"/>
+      </p:ext>
+    </p:extLst>
+  </p:cSld>
+  <p:clrMapOvr>
+    <a:masterClrMapping/>
+  </p:clrMapOvr>
+</p:sld>
+</file>
+
+<file path=ppt/slides/slide6.xml><?xml version="1.0" encoding="utf-8"?>
+<p:sld xmlns:a="http://schemas.openxmlformats.org/drawingml/2006/main" xmlns:r="http://schemas.openxmlformats.org/officeDocument/2006/relationships" xmlns:p="http://schemas.openxmlformats.org/presentationml/2006/main">
+  <p:cSld>
+    <p:spTree>
+      <p:nvGrpSpPr>
+        <p:cNvPr id="1" name=""/>
+        <p:cNvGrpSpPr/>
+        <p:nvPr/>
+      </p:nvGrpSpPr>
+      <p:grpSpPr>
+        <a:xfrm>
+          <a:off x="0" y="0"/>
+          <a:ext cx="0" cy="0"/>
+          <a:chOff x="0" y="0"/>
+          <a:chExt cx="0" cy="0"/>
+        </a:xfrm>
+      </p:grpSpPr>
+      <p:pic>
+        <p:nvPicPr>
+          <p:cNvPr id="5" name="Imagem 4"/>
+          <p:cNvPicPr>
+            <a:picLocks noChangeAspect="1"/>
+          </p:cNvPicPr>
+          <p:nvPr/>
+        </p:nvPicPr>
+        <p:blipFill>
+          <a:blip r:embed="rId2">
+            <a:extLst>
+              <a:ext uri="{28A0092B-C50C-407E-A947-70E740481C1C}">
+                <a14:useLocalDpi xmlns:a14="http://schemas.microsoft.com/office/drawing/2010/main" val="0"/>
+              </a:ext>
+            </a:extLst>
+          </a:blip>
+          <a:stretch>
+            <a:fillRect/>
+          </a:stretch>
+        </p:blipFill>
+        <p:spPr>
+          <a:xfrm>
+            <a:off x="5612706" y="3668593"/>
+            <a:ext cx="1080000" cy="1080000"/>
+          </a:xfrm>
+          <a:prstGeom prst="rect">
+            <a:avLst/>
+          </a:prstGeom>
+        </p:spPr>
+      </p:pic>
+      <p:pic>
+        <p:nvPicPr>
+          <p:cNvPr id="6" name="Imagem 5"/>
+          <p:cNvPicPr>
+            <a:picLocks noChangeAspect="1"/>
+          </p:cNvPicPr>
+          <p:nvPr/>
+        </p:nvPicPr>
+        <p:blipFill>
+          <a:blip r:embed="rId3">
+            <a:extLst>
+              <a:ext uri="{28A0092B-C50C-407E-A947-70E740481C1C}">
+                <a14:useLocalDpi xmlns:a14="http://schemas.microsoft.com/office/drawing/2010/main" val="0"/>
+              </a:ext>
+            </a:extLst>
+          </a:blip>
+          <a:stretch>
+            <a:fillRect/>
+          </a:stretch>
+        </p:blipFill>
+        <p:spPr>
+          <a:xfrm>
+            <a:off x="2974268" y="3668593"/>
+            <a:ext cx="1080000" cy="1080000"/>
+          </a:xfrm>
+          <a:prstGeom prst="rect">
+            <a:avLst/>
+          </a:prstGeom>
+        </p:spPr>
+      </p:pic>
+      <p:pic>
+        <p:nvPicPr>
+          <p:cNvPr id="7" name="Imagem 6"/>
+          <p:cNvPicPr>
+            <a:picLocks noChangeAspect="1"/>
+          </p:cNvPicPr>
+          <p:nvPr/>
+        </p:nvPicPr>
+        <p:blipFill>
+          <a:blip r:embed="rId4">
+            <a:extLst>
+              <a:ext uri="{28A0092B-C50C-407E-A947-70E740481C1C}">
+                <a14:useLocalDpi xmlns:a14="http://schemas.microsoft.com/office/drawing/2010/main" val="0"/>
+              </a:ext>
+            </a:extLst>
+          </a:blip>
+          <a:stretch>
+            <a:fillRect/>
+          </a:stretch>
+        </p:blipFill>
+        <p:spPr>
+          <a:xfrm>
+            <a:off x="4293487" y="3668593"/>
+            <a:ext cx="1080000" cy="1080000"/>
+          </a:xfrm>
+          <a:prstGeom prst="rect">
+            <a:avLst/>
+          </a:prstGeom>
+        </p:spPr>
+      </p:pic>
+      <p:pic>
+        <p:nvPicPr>
+          <p:cNvPr id="8" name="Imagem 7"/>
+          <p:cNvPicPr>
+            <a:picLocks noChangeAspect="1"/>
+          </p:cNvPicPr>
+          <p:nvPr/>
+        </p:nvPicPr>
+        <p:blipFill>
+          <a:blip r:embed="rId5">
+            <a:extLst>
+              <a:ext uri="{28A0092B-C50C-407E-A947-70E740481C1C}">
+                <a14:useLocalDpi xmlns:a14="http://schemas.microsoft.com/office/drawing/2010/main" val="0"/>
+              </a:ext>
+            </a:extLst>
+          </a:blip>
+          <a:stretch>
+            <a:fillRect/>
+          </a:stretch>
+        </p:blipFill>
+        <p:spPr>
+          <a:xfrm>
+            <a:off x="5612706" y="4984575"/>
+            <a:ext cx="1080000" cy="1080000"/>
+          </a:xfrm>
+          <a:prstGeom prst="rect">
+            <a:avLst/>
+          </a:prstGeom>
+        </p:spPr>
+      </p:pic>
+      <p:pic>
+        <p:nvPicPr>
+          <p:cNvPr id="9" name="Imagem 8"/>
+          <p:cNvPicPr>
+            <a:picLocks noChangeAspect="1"/>
+          </p:cNvPicPr>
+          <p:nvPr/>
+        </p:nvPicPr>
+        <p:blipFill>
+          <a:blip r:embed="rId6">
+            <a:extLst>
+              <a:ext uri="{28A0092B-C50C-407E-A947-70E740481C1C}">
+                <a14:useLocalDpi xmlns:a14="http://schemas.microsoft.com/office/drawing/2010/main" val="0"/>
+              </a:ext>
+            </a:extLst>
+          </a:blip>
+          <a:stretch>
+            <a:fillRect/>
+          </a:stretch>
+        </p:blipFill>
+        <p:spPr>
+          <a:xfrm>
+            <a:off x="2974268" y="4984575"/>
+            <a:ext cx="1080000" cy="1080000"/>
+          </a:xfrm>
+          <a:prstGeom prst="rect">
+            <a:avLst/>
+          </a:prstGeom>
+        </p:spPr>
+      </p:pic>
+      <p:pic>
+        <p:nvPicPr>
+          <p:cNvPr id="10" name="Imagem 9"/>
+          <p:cNvPicPr>
+            <a:picLocks noChangeAspect="1"/>
+          </p:cNvPicPr>
+          <p:nvPr/>
+        </p:nvPicPr>
+        <p:blipFill>
+          <a:blip r:embed="rId7">
+            <a:extLst>
+              <a:ext uri="{28A0092B-C50C-407E-A947-70E740481C1C}">
+                <a14:useLocalDpi xmlns:a14="http://schemas.microsoft.com/office/drawing/2010/main" val="0"/>
+              </a:ext>
+            </a:extLst>
+          </a:blip>
+          <a:stretch>
+            <a:fillRect/>
+          </a:stretch>
+        </p:blipFill>
+        <p:spPr>
+          <a:xfrm>
+            <a:off x="4293487" y="4984575"/>
+            <a:ext cx="1080000" cy="1080000"/>
+          </a:xfrm>
+          <a:prstGeom prst="rect">
+            <a:avLst/>
+          </a:prstGeom>
+        </p:spPr>
+      </p:pic>
+      <p:pic>
+        <p:nvPicPr>
+          <p:cNvPr id="11" name="Imagem 10"/>
+          <p:cNvPicPr>
+            <a:picLocks noChangeAspect="1"/>
+          </p:cNvPicPr>
+          <p:nvPr/>
+        </p:nvPicPr>
+        <p:blipFill>
+          <a:blip r:embed="rId8">
+            <a:extLst>
+              <a:ext uri="{28A0092B-C50C-407E-A947-70E740481C1C}">
+                <a14:useLocalDpi xmlns:a14="http://schemas.microsoft.com/office/drawing/2010/main" val="0"/>
+              </a:ext>
+            </a:extLst>
+          </a:blip>
+          <a:stretch>
+            <a:fillRect/>
+          </a:stretch>
+        </p:blipFill>
+        <p:spPr>
+          <a:xfrm>
+            <a:off x="5612706" y="1036631"/>
+            <a:ext cx="1080000" cy="1080000"/>
+          </a:xfrm>
+          <a:prstGeom prst="rect">
+            <a:avLst/>
+          </a:prstGeom>
+        </p:spPr>
+      </p:pic>
+      <p:pic>
+        <p:nvPicPr>
+          <p:cNvPr id="12" name="Imagem 11"/>
+          <p:cNvPicPr>
+            <a:picLocks noChangeAspect="1"/>
+          </p:cNvPicPr>
+          <p:nvPr/>
+        </p:nvPicPr>
+        <p:blipFill>
+          <a:blip r:embed="rId9">
+            <a:extLst>
+              <a:ext uri="{28A0092B-C50C-407E-A947-70E740481C1C}">
+                <a14:useLocalDpi xmlns:a14="http://schemas.microsoft.com/office/drawing/2010/main" val="0"/>
+              </a:ext>
+            </a:extLst>
+          </a:blip>
+          <a:stretch>
+            <a:fillRect/>
+          </a:stretch>
+        </p:blipFill>
+        <p:spPr>
+          <a:xfrm>
+            <a:off x="4293487" y="1036631"/>
+            <a:ext cx="1080000" cy="1080000"/>
+          </a:xfrm>
+          <a:prstGeom prst="rect">
+            <a:avLst/>
+          </a:prstGeom>
+        </p:spPr>
+      </p:pic>
+      <p:pic>
+        <p:nvPicPr>
+          <p:cNvPr id="13" name="Imagem 12"/>
+          <p:cNvPicPr>
+            <a:picLocks noChangeAspect="1"/>
+          </p:cNvPicPr>
+          <p:nvPr/>
+        </p:nvPicPr>
+        <p:blipFill>
+          <a:blip r:embed="rId10">
+            <a:extLst>
+              <a:ext uri="{28A0092B-C50C-407E-A947-70E740481C1C}">
+                <a14:useLocalDpi xmlns:a14="http://schemas.microsoft.com/office/drawing/2010/main" val="0"/>
+              </a:ext>
+            </a:extLst>
+          </a:blip>
+          <a:stretch>
+            <a:fillRect/>
+          </a:stretch>
+        </p:blipFill>
+        <p:spPr>
+          <a:xfrm>
+            <a:off x="2974268" y="1036631"/>
+            <a:ext cx="1080000" cy="1080000"/>
+          </a:xfrm>
+          <a:prstGeom prst="rect">
+            <a:avLst/>
+          </a:prstGeom>
+        </p:spPr>
+      </p:pic>
+      <p:pic>
+        <p:nvPicPr>
+          <p:cNvPr id="14" name="Imagem 13"/>
+          <p:cNvPicPr>
+            <a:picLocks noChangeAspect="1"/>
+          </p:cNvPicPr>
+          <p:nvPr/>
+        </p:nvPicPr>
+        <p:blipFill>
+          <a:blip r:embed="rId11">
+            <a:extLst>
+              <a:ext uri="{28A0092B-C50C-407E-A947-70E740481C1C}">
+                <a14:useLocalDpi xmlns:a14="http://schemas.microsoft.com/office/drawing/2010/main" val="0"/>
+              </a:ext>
+            </a:extLst>
+          </a:blip>
+          <a:stretch>
+            <a:fillRect/>
+          </a:stretch>
+        </p:blipFill>
+        <p:spPr>
+          <a:xfrm>
+            <a:off x="5612706" y="2352612"/>
+            <a:ext cx="1080000" cy="1080000"/>
+          </a:xfrm>
+          <a:prstGeom prst="rect">
+            <a:avLst/>
+          </a:prstGeom>
+        </p:spPr>
+      </p:pic>
+      <p:pic>
+        <p:nvPicPr>
+          <p:cNvPr id="15" name="Imagem 14"/>
+          <p:cNvPicPr>
+            <a:picLocks noChangeAspect="1"/>
+          </p:cNvPicPr>
+          <p:nvPr/>
+        </p:nvPicPr>
+        <p:blipFill>
+          <a:blip r:embed="rId12">
+            <a:extLst>
+              <a:ext uri="{28A0092B-C50C-407E-A947-70E740481C1C}">
+                <a14:useLocalDpi xmlns:a14="http://schemas.microsoft.com/office/drawing/2010/main" val="0"/>
+              </a:ext>
+            </a:extLst>
+          </a:blip>
+          <a:stretch>
+            <a:fillRect/>
+          </a:stretch>
+        </p:blipFill>
+        <p:spPr>
+          <a:xfrm>
+            <a:off x="4293487" y="2352612"/>
+            <a:ext cx="1080000" cy="1080000"/>
+          </a:xfrm>
+          <a:prstGeom prst="rect">
+            <a:avLst/>
+          </a:prstGeom>
+        </p:spPr>
+      </p:pic>
+      <p:pic>
+        <p:nvPicPr>
+          <p:cNvPr id="16" name="Imagem 15"/>
+          <p:cNvPicPr>
+            <a:picLocks noChangeAspect="1"/>
+          </p:cNvPicPr>
+          <p:nvPr/>
+        </p:nvPicPr>
+        <p:blipFill>
+          <a:blip r:embed="rId13">
+            <a:extLst>
+              <a:ext uri="{28A0092B-C50C-407E-A947-70E740481C1C}">
+                <a14:useLocalDpi xmlns:a14="http://schemas.microsoft.com/office/drawing/2010/main" val="0"/>
+              </a:ext>
+            </a:extLst>
+          </a:blip>
+          <a:stretch>
+            <a:fillRect/>
+          </a:stretch>
+        </p:blipFill>
+        <p:spPr>
+          <a:xfrm>
+            <a:off x="2974268" y="2352612"/>
+            <a:ext cx="1080000" cy="1080000"/>
+          </a:xfrm>
+          <a:prstGeom prst="rect">
+            <a:avLst/>
+          </a:prstGeom>
+        </p:spPr>
+      </p:pic>
+    </p:spTree>
+    <p:extLst>
+      <p:ext uri="{BB962C8B-B14F-4D97-AF65-F5344CB8AC3E}">
+        <p14:creationId xmlns:p14="http://schemas.microsoft.com/office/powerpoint/2010/main" val="4007364200"/>
       </p:ext>
     </p:extLst>
   </p:cSld>

</xml_diff>